<commit_message>
some changes on kotlin code
</commit_message>
<xml_diff>
--- a/Grafici power consumption.pptx
+++ b/Grafici power consumption.pptx
@@ -288,47 +288,53 @@
           </c:dLbls>
           <c:cat>
             <c:strRef>
-              <c:f>Sheet1!$A$2:$A$6</c:f>
+              <c:f>Sheet1!$A$2:$A$7</c:f>
               <c:strCache>
-                <c:ptCount val="5"/>
+                <c:ptCount val="6"/>
                 <c:pt idx="0">
                   <c:v>Facebook</c:v>
                 </c:pt>
                 <c:pt idx="1">
+                  <c:v>Youtube</c:v>
+                </c:pt>
+                <c:pt idx="2">
                   <c:v>X</c:v>
                 </c:pt>
-                <c:pt idx="2">
+                <c:pt idx="3">
                   <c:v>SonicRoutes</c:v>
                 </c:pt>
-                <c:pt idx="3">
+                <c:pt idx="4">
+                  <c:v>Google Maps</c:v>
+                </c:pt>
+                <c:pt idx="5">
                   <c:v>Telegram</c:v>
-                </c:pt>
-                <c:pt idx="4">
-                  <c:v>Youtube</c:v>
                 </c:pt>
               </c:strCache>
             </c:strRef>
           </c:cat>
           <c:val>
             <c:numRef>
-              <c:f>Sheet1!$B$2:$B$6</c:f>
+              <c:f>Sheet1!$B$2:$B$7</c:f>
               <c:numCache>
                 <c:formatCode>General</c:formatCode>
-                <c:ptCount val="5"/>
+                <c:ptCount val="6"/>
                 <c:pt idx="0">
                   <c:v>71.78</c:v>
                 </c:pt>
                 <c:pt idx="1">
+                  <c:v>18.7</c:v>
+                </c:pt>
+                <c:pt idx="2">
                   <c:v>41.36</c:v>
                 </c:pt>
-                <c:pt idx="2">
+                <c:pt idx="3">
                   <c:v>40.6</c:v>
                 </c:pt>
-                <c:pt idx="3">
+                <c:pt idx="4">
+                  <c:v>9.5</c:v>
+                </c:pt>
+                <c:pt idx="5">
                   <c:v>41.05</c:v>
-                </c:pt>
-                <c:pt idx="4">
-                  <c:v>18.7</c:v>
                 </c:pt>
               </c:numCache>
             </c:numRef>
@@ -423,47 +429,53 @@
           </c:dLbls>
           <c:cat>
             <c:strRef>
-              <c:f>Sheet1!$A$2:$A$6</c:f>
+              <c:f>Sheet1!$A$2:$A$7</c:f>
               <c:strCache>
-                <c:ptCount val="5"/>
+                <c:ptCount val="6"/>
                 <c:pt idx="0">
                   <c:v>Facebook</c:v>
                 </c:pt>
                 <c:pt idx="1">
+                  <c:v>Youtube</c:v>
+                </c:pt>
+                <c:pt idx="2">
                   <c:v>X</c:v>
                 </c:pt>
-                <c:pt idx="2">
+                <c:pt idx="3">
                   <c:v>SonicRoutes</c:v>
                 </c:pt>
-                <c:pt idx="3">
+                <c:pt idx="4">
+                  <c:v>Google Maps</c:v>
+                </c:pt>
+                <c:pt idx="5">
                   <c:v>Telegram</c:v>
-                </c:pt>
-                <c:pt idx="4">
-                  <c:v>Youtube</c:v>
                 </c:pt>
               </c:strCache>
             </c:strRef>
           </c:cat>
           <c:val>
             <c:numRef>
-              <c:f>Sheet1!$C$2:$C$6</c:f>
+              <c:f>Sheet1!$C$2:$C$7</c:f>
               <c:numCache>
                 <c:formatCode>General</c:formatCode>
-                <c:ptCount val="5"/>
+                <c:ptCount val="6"/>
                 <c:pt idx="0">
                   <c:v>18.05</c:v>
                 </c:pt>
                 <c:pt idx="1">
+                  <c:v>3.82</c:v>
+                </c:pt>
+                <c:pt idx="2">
                   <c:v>3.77</c:v>
                 </c:pt>
-                <c:pt idx="2">
+                <c:pt idx="3">
                   <c:v>3.33</c:v>
                 </c:pt>
-                <c:pt idx="3">
+                <c:pt idx="4">
+                  <c:v>0.67</c:v>
+                </c:pt>
+                <c:pt idx="5">
                   <c:v>2.85</c:v>
-                </c:pt>
-                <c:pt idx="4">
-                  <c:v>3.82</c:v>
                 </c:pt>
               </c:numCache>
             </c:numRef>
@@ -842,47 +854,53 @@
           </c:dLbls>
           <c:cat>
             <c:strRef>
-              <c:f>Sheet1!$A$2:$A$6</c:f>
+              <c:f>Sheet1!$A$2:$A$7</c:f>
               <c:strCache>
-                <c:ptCount val="5"/>
+                <c:ptCount val="6"/>
                 <c:pt idx="0">
                   <c:v>Facebook</c:v>
                 </c:pt>
                 <c:pt idx="1">
+                  <c:v>Youtube</c:v>
+                </c:pt>
+                <c:pt idx="2">
                   <c:v>X</c:v>
                 </c:pt>
-                <c:pt idx="2">
+                <c:pt idx="3">
                   <c:v>SonicRoutes</c:v>
                 </c:pt>
-                <c:pt idx="3">
+                <c:pt idx="4">
+                  <c:v>Google Maps</c:v>
+                </c:pt>
+                <c:pt idx="5">
                   <c:v>Telegram</c:v>
-                </c:pt>
-                <c:pt idx="4">
-                  <c:v>Youtube</c:v>
                 </c:pt>
               </c:strCache>
             </c:strRef>
           </c:cat>
           <c:val>
             <c:numRef>
-              <c:f>Sheet1!$B$2:$B$6</c:f>
+              <c:f>Sheet1!$B$2:$B$7</c:f>
               <c:numCache>
                 <c:formatCode>General</c:formatCode>
-                <c:ptCount val="5"/>
+                <c:ptCount val="6"/>
                 <c:pt idx="0">
                   <c:v>0.251</c:v>
                 </c:pt>
                 <c:pt idx="1">
+                  <c:v>0.20399999999999999</c:v>
+                </c:pt>
+                <c:pt idx="2">
                   <c:v>9.0999999999999998E-2</c:v>
                 </c:pt>
-                <c:pt idx="2">
+                <c:pt idx="3">
                   <c:v>8.2000000000000003E-2</c:v>
                 </c:pt>
-                <c:pt idx="3">
+                <c:pt idx="4">
+                  <c:v>7.0999999999999994E-2</c:v>
+                </c:pt>
+                <c:pt idx="5">
                   <c:v>6.9000000000000006E-2</c:v>
-                </c:pt>
-                <c:pt idx="4">
-                  <c:v>0.20399999999999999</c:v>
                 </c:pt>
               </c:numCache>
             </c:numRef>
@@ -2322,7 +2340,7 @@
           <a:p>
             <a:fld id="{93B35A93-12E4-45CF-B1A7-127356D5F448}" type="datetimeFigureOut">
               <a:rPr lang="it-IT" smtClean="0"/>
-              <a:t>24/05/2024</a:t>
+              <a:t>25/05/2024</a:t>
             </a:fld>
             <a:endParaRPr lang="it-IT"/>
           </a:p>
@@ -2522,7 +2540,7 @@
           <a:p>
             <a:fld id="{93B35A93-12E4-45CF-B1A7-127356D5F448}" type="datetimeFigureOut">
               <a:rPr lang="it-IT" smtClean="0"/>
-              <a:t>24/05/2024</a:t>
+              <a:t>25/05/2024</a:t>
             </a:fld>
             <a:endParaRPr lang="it-IT"/>
           </a:p>
@@ -2732,7 +2750,7 @@
           <a:p>
             <a:fld id="{93B35A93-12E4-45CF-B1A7-127356D5F448}" type="datetimeFigureOut">
               <a:rPr lang="it-IT" smtClean="0"/>
-              <a:t>24/05/2024</a:t>
+              <a:t>25/05/2024</a:t>
             </a:fld>
             <a:endParaRPr lang="it-IT"/>
           </a:p>
@@ -2932,7 +2950,7 @@
           <a:p>
             <a:fld id="{93B35A93-12E4-45CF-B1A7-127356D5F448}" type="datetimeFigureOut">
               <a:rPr lang="it-IT" smtClean="0"/>
-              <a:t>24/05/2024</a:t>
+              <a:t>25/05/2024</a:t>
             </a:fld>
             <a:endParaRPr lang="it-IT"/>
           </a:p>
@@ -3208,7 +3226,7 @@
           <a:p>
             <a:fld id="{93B35A93-12E4-45CF-B1A7-127356D5F448}" type="datetimeFigureOut">
               <a:rPr lang="it-IT" smtClean="0"/>
-              <a:t>24/05/2024</a:t>
+              <a:t>25/05/2024</a:t>
             </a:fld>
             <a:endParaRPr lang="it-IT"/>
           </a:p>
@@ -3476,7 +3494,7 @@
           <a:p>
             <a:fld id="{93B35A93-12E4-45CF-B1A7-127356D5F448}" type="datetimeFigureOut">
               <a:rPr lang="it-IT" smtClean="0"/>
-              <a:t>24/05/2024</a:t>
+              <a:t>25/05/2024</a:t>
             </a:fld>
             <a:endParaRPr lang="it-IT"/>
           </a:p>
@@ -3891,7 +3909,7 @@
           <a:p>
             <a:fld id="{93B35A93-12E4-45CF-B1A7-127356D5F448}" type="datetimeFigureOut">
               <a:rPr lang="it-IT" smtClean="0"/>
-              <a:t>24/05/2024</a:t>
+              <a:t>25/05/2024</a:t>
             </a:fld>
             <a:endParaRPr lang="it-IT"/>
           </a:p>
@@ -4033,7 +4051,7 @@
           <a:p>
             <a:fld id="{93B35A93-12E4-45CF-B1A7-127356D5F448}" type="datetimeFigureOut">
               <a:rPr lang="it-IT" smtClean="0"/>
-              <a:t>24/05/2024</a:t>
+              <a:t>25/05/2024</a:t>
             </a:fld>
             <a:endParaRPr lang="it-IT"/>
           </a:p>
@@ -4146,7 +4164,7 @@
           <a:p>
             <a:fld id="{93B35A93-12E4-45CF-B1A7-127356D5F448}" type="datetimeFigureOut">
               <a:rPr lang="it-IT" smtClean="0"/>
-              <a:t>24/05/2024</a:t>
+              <a:t>25/05/2024</a:t>
             </a:fld>
             <a:endParaRPr lang="it-IT"/>
           </a:p>
@@ -4459,7 +4477,7 @@
           <a:p>
             <a:fld id="{93B35A93-12E4-45CF-B1A7-127356D5F448}" type="datetimeFigureOut">
               <a:rPr lang="it-IT" smtClean="0"/>
-              <a:t>24/05/2024</a:t>
+              <a:t>25/05/2024</a:t>
             </a:fld>
             <a:endParaRPr lang="it-IT"/>
           </a:p>
@@ -4748,7 +4766,7 @@
           <a:p>
             <a:fld id="{93B35A93-12E4-45CF-B1A7-127356D5F448}" type="datetimeFigureOut">
               <a:rPr lang="it-IT" smtClean="0"/>
-              <a:t>24/05/2024</a:t>
+              <a:t>25/05/2024</a:t>
             </a:fld>
             <a:endParaRPr lang="it-IT"/>
           </a:p>
@@ -4991,7 +5009,7 @@
           <a:p>
             <a:fld id="{93B35A93-12E4-45CF-B1A7-127356D5F448}" type="datetimeFigureOut">
               <a:rPr lang="it-IT" smtClean="0"/>
-              <a:t>24/05/2024</a:t>
+              <a:t>25/05/2024</a:t>
             </a:fld>
             <a:endParaRPr lang="it-IT"/>
           </a:p>
@@ -5421,7 +5439,7 @@
           <p:nvPr>
             <p:extLst>
               <p:ext uri="{D42A27DB-BD31-4B8C-83A1-F6EECF244321}">
-                <p14:modId xmlns:p14="http://schemas.microsoft.com/office/powerpoint/2010/main" val="2216577987"/>
+                <p14:modId xmlns:p14="http://schemas.microsoft.com/office/powerpoint/2010/main" val="3260096564"/>
               </p:ext>
             </p:extLst>
           </p:nvPr>
@@ -5479,7 +5497,7 @@
           <p:nvPr>
             <p:extLst>
               <p:ext uri="{D42A27DB-BD31-4B8C-83A1-F6EECF244321}">
-                <p14:modId xmlns:p14="http://schemas.microsoft.com/office/powerpoint/2010/main" val="1545693975"/>
+                <p14:modId xmlns:p14="http://schemas.microsoft.com/office/powerpoint/2010/main" val="714808757"/>
               </p:ext>
             </p:extLst>
           </p:nvPr>

</xml_diff>